<commit_message>
resized image in takeaway slides
</commit_message>
<xml_diff>
--- a/docs/PAH_Takeaways.pptx
+++ b/docs/PAH_Takeaways.pptx
@@ -3121,8 +3121,8 @@
         </p:blipFill>
         <p:spPr>
           <a:xfrm>
-            <a:off x="1914769" y="488461"/>
-            <a:ext cx="5314462" cy="5314462"/>
+            <a:off x="2624475" y="1240117"/>
+            <a:ext cx="3905394" cy="3905394"/>
           </a:xfrm>
           <a:prstGeom prst="rect">
             <a:avLst/>
@@ -3139,8 +3139,8 @@
         </p:nvSpPr>
         <p:spPr>
           <a:xfrm>
-            <a:off x="1914769" y="6144847"/>
-            <a:ext cx="5314462" cy="461665"/>
+            <a:off x="2624475" y="5914014"/>
+            <a:ext cx="3905394" cy="461665"/>
           </a:xfrm>
           <a:prstGeom prst="rect">
             <a:avLst/>

</xml_diff>